<commit_message>
Probably the final version for post
</commit_message>
<xml_diff>
--- a/posts/2023/2023-07-31-git-mark-decisions/timeline.pptx
+++ b/posts/2023/2023-07-31-git-mark-decisions/timeline.pptx
@@ -63,7 +63,7 @@
         <p:txBody>
           <a:bodyPr/>
           <a:p>
-            <a:fld id="{17EF762B-620A-4D86-B762-29C8DA3723A3}" type="slidenum">
+            <a:fld id="{1F9376DA-2CCF-44B6-92A8-DAA03E5548AA}" type="slidenum">
               <a:t>&lt;#&gt;</a:t>
             </a:fld>
           </a:p>
@@ -125,7 +125,7 @@
         <p:spPr>
           <a:xfrm>
             <a:off x="504000" y="226080"/>
-            <a:ext cx="9071280" cy="946080"/>
+            <a:ext cx="9070920" cy="945720"/>
           </a:xfrm>
           <a:prstGeom prst="rect">
             <a:avLst/>
@@ -165,7 +165,7 @@
         <p:spPr>
           <a:xfrm>
             <a:off x="630000" y="1010520"/>
-            <a:ext cx="11339640" cy="1194480"/>
+            <a:ext cx="11339280" cy="1194480"/>
           </a:xfrm>
           <a:prstGeom prst="rect">
             <a:avLst/>
@@ -208,7 +208,7 @@
         <p:spPr>
           <a:xfrm>
             <a:off x="630000" y="2318760"/>
-            <a:ext cx="11339640" cy="1194480"/>
+            <a:ext cx="11339280" cy="1194480"/>
           </a:xfrm>
           <a:prstGeom prst="rect">
             <a:avLst/>
@@ -272,7 +272,7 @@
         <p:txBody>
           <a:bodyPr/>
           <a:p>
-            <a:fld id="{1A379114-FB51-4D9A-9FA7-0C9CB6128B97}" type="slidenum">
+            <a:fld id="{D2D90B79-2C0F-4942-9AD5-C21464A7C4B3}" type="slidenum">
               <a:t>&lt;#&gt;</a:t>
             </a:fld>
           </a:p>
@@ -334,7 +334,7 @@
         <p:spPr>
           <a:xfrm>
             <a:off x="504000" y="226080"/>
-            <a:ext cx="9071280" cy="946080"/>
+            <a:ext cx="9070920" cy="945720"/>
           </a:xfrm>
           <a:prstGeom prst="rect">
             <a:avLst/>
@@ -567,7 +567,7 @@
         <p:txBody>
           <a:bodyPr/>
           <a:p>
-            <a:fld id="{395EA878-1477-49A7-80CA-10D18D7C7DF5}" type="slidenum">
+            <a:fld id="{326CDF9A-0CCC-48B4-896C-76C49BD85BB7}" type="slidenum">
               <a:t>&lt;#&gt;</a:t>
             </a:fld>
           </a:p>
@@ -629,7 +629,7 @@
         <p:spPr>
           <a:xfrm>
             <a:off x="504000" y="226080"/>
-            <a:ext cx="9071280" cy="946080"/>
+            <a:ext cx="9070920" cy="945720"/>
           </a:xfrm>
           <a:prstGeom prst="rect">
             <a:avLst/>
@@ -948,7 +948,7 @@
         <p:txBody>
           <a:bodyPr/>
           <a:p>
-            <a:fld id="{66E0E281-544D-4325-99A4-EABD002D0BD2}" type="slidenum">
+            <a:fld id="{ED274EA6-B05D-48C9-9067-E7EF0F0B85DF}" type="slidenum">
               <a:t>&lt;#&gt;</a:t>
             </a:fld>
           </a:p>
@@ -1010,7 +1010,7 @@
         <p:spPr>
           <a:xfrm>
             <a:off x="504000" y="226080"/>
-            <a:ext cx="9071280" cy="946080"/>
+            <a:ext cx="9070920" cy="945720"/>
           </a:xfrm>
           <a:prstGeom prst="rect">
             <a:avLst/>
@@ -1050,7 +1050,7 @@
         <p:spPr>
           <a:xfrm>
             <a:off x="630000" y="1010520"/>
-            <a:ext cx="11339640" cy="2504880"/>
+            <a:ext cx="11339280" cy="2504520"/>
           </a:xfrm>
           <a:prstGeom prst="rect">
             <a:avLst/>
@@ -1111,7 +1111,7 @@
         <p:txBody>
           <a:bodyPr/>
           <a:p>
-            <a:fld id="{925B0496-3A7C-46CD-9B9A-03481485A642}" type="slidenum">
+            <a:fld id="{02A2014C-6488-4AA6-95B3-05AB3EE56052}" type="slidenum">
               <a:t>&lt;#&gt;</a:t>
             </a:fld>
           </a:p>
@@ -1173,7 +1173,7 @@
         <p:spPr>
           <a:xfrm>
             <a:off x="504000" y="226080"/>
-            <a:ext cx="9071280" cy="946080"/>
+            <a:ext cx="9070920" cy="945720"/>
           </a:xfrm>
           <a:prstGeom prst="rect">
             <a:avLst/>
@@ -1213,7 +1213,7 @@
         <p:spPr>
           <a:xfrm>
             <a:off x="630000" y="1010520"/>
-            <a:ext cx="11339640" cy="2504880"/>
+            <a:ext cx="11339280" cy="2504520"/>
           </a:xfrm>
           <a:prstGeom prst="rect">
             <a:avLst/>
@@ -1277,7 +1277,7 @@
         <p:txBody>
           <a:bodyPr/>
           <a:p>
-            <a:fld id="{C6720519-9115-4C8B-B4FF-7D7BEB2FB9B7}" type="slidenum">
+            <a:fld id="{10477AF6-7A8A-461C-ADAE-6A05545CC740}" type="slidenum">
               <a:t>&lt;#&gt;</a:t>
             </a:fld>
           </a:p>
@@ -1339,7 +1339,7 @@
         <p:spPr>
           <a:xfrm>
             <a:off x="504000" y="226080"/>
-            <a:ext cx="9071280" cy="946080"/>
+            <a:ext cx="9070920" cy="945720"/>
           </a:xfrm>
           <a:prstGeom prst="rect">
             <a:avLst/>
@@ -1379,7 +1379,7 @@
         <p:spPr>
           <a:xfrm>
             <a:off x="630000" y="1010520"/>
-            <a:ext cx="5533560" cy="2504880"/>
+            <a:ext cx="5533560" cy="2504520"/>
           </a:xfrm>
           <a:prstGeom prst="rect">
             <a:avLst/>
@@ -1422,7 +1422,7 @@
         <p:spPr>
           <a:xfrm>
             <a:off x="6440760" y="1010520"/>
-            <a:ext cx="5533560" cy="2504880"/>
+            <a:ext cx="5533560" cy="2504520"/>
           </a:xfrm>
           <a:prstGeom prst="rect">
             <a:avLst/>
@@ -1486,7 +1486,7 @@
         <p:txBody>
           <a:bodyPr/>
           <a:p>
-            <a:fld id="{0EF28779-F33A-4852-B0E8-FD327C66ABE5}" type="slidenum">
+            <a:fld id="{B641C0FE-B8FD-4329-8B80-9AD463D0852B}" type="slidenum">
               <a:t>&lt;#&gt;</a:t>
             </a:fld>
           </a:p>
@@ -1548,7 +1548,7 @@
         <p:spPr>
           <a:xfrm>
             <a:off x="504000" y="226080"/>
-            <a:ext cx="9071280" cy="946080"/>
+            <a:ext cx="9070920" cy="945720"/>
           </a:xfrm>
           <a:prstGeom prst="rect">
             <a:avLst/>
@@ -1609,7 +1609,7 @@
         <p:txBody>
           <a:bodyPr/>
           <a:p>
-            <a:fld id="{9103F0A5-9288-4786-8BE7-E4F9A955E115}" type="slidenum">
+            <a:fld id="{3A24AC0C-5F9E-45C9-B6DF-8279CEFFFD68}" type="slidenum">
               <a:t>&lt;#&gt;</a:t>
             </a:fld>
           </a:p>
@@ -1671,7 +1671,7 @@
         <p:spPr>
           <a:xfrm>
             <a:off x="504000" y="226080"/>
-            <a:ext cx="9071280" cy="4386600"/>
+            <a:ext cx="9070920" cy="4385160"/>
           </a:xfrm>
           <a:prstGeom prst="rect">
             <a:avLst/>
@@ -1730,7 +1730,7 @@
         <p:txBody>
           <a:bodyPr/>
           <a:p>
-            <a:fld id="{5C96CE1C-692F-4746-B5DF-1FBD65032AA8}" type="slidenum">
+            <a:fld id="{30D5E681-E975-4043-A4EB-BB56A15106F2}" type="slidenum">
               <a:t>&lt;#&gt;</a:t>
             </a:fld>
           </a:p>
@@ -1792,7 +1792,7 @@
         <p:spPr>
           <a:xfrm>
             <a:off x="504000" y="226080"/>
-            <a:ext cx="9071280" cy="946080"/>
+            <a:ext cx="9070920" cy="945720"/>
           </a:xfrm>
           <a:prstGeom prst="rect">
             <a:avLst/>
@@ -1875,7 +1875,7 @@
         <p:spPr>
           <a:xfrm>
             <a:off x="6440760" y="1010520"/>
-            <a:ext cx="5533560" cy="2504880"/>
+            <a:ext cx="5533560" cy="2504520"/>
           </a:xfrm>
           <a:prstGeom prst="rect">
             <a:avLst/>
@@ -1982,7 +1982,7 @@
         <p:txBody>
           <a:bodyPr/>
           <a:p>
-            <a:fld id="{AC5C8731-86B9-4883-B32E-4125BF49D521}" type="slidenum">
+            <a:fld id="{7B1D66F8-7AB7-4B36-B5EC-DF8B36E07746}" type="slidenum">
               <a:t>&lt;#&gt;</a:t>
             </a:fld>
           </a:p>
@@ -2044,7 +2044,7 @@
         <p:spPr>
           <a:xfrm>
             <a:off x="504000" y="226080"/>
-            <a:ext cx="9071280" cy="946080"/>
+            <a:ext cx="9070920" cy="945720"/>
           </a:xfrm>
           <a:prstGeom prst="rect">
             <a:avLst/>
@@ -2084,7 +2084,7 @@
         <p:spPr>
           <a:xfrm>
             <a:off x="630000" y="1010520"/>
-            <a:ext cx="5533560" cy="2504880"/>
+            <a:ext cx="5533560" cy="2504520"/>
           </a:xfrm>
           <a:prstGeom prst="rect">
             <a:avLst/>
@@ -2234,7 +2234,7 @@
         <p:txBody>
           <a:bodyPr/>
           <a:p>
-            <a:fld id="{79811CD8-C63B-4606-81F0-9E57CC39C766}" type="slidenum">
+            <a:fld id="{68BE0FA3-F905-412C-8C71-3515C9D624DD}" type="slidenum">
               <a:t>&lt;#&gt;</a:t>
             </a:fld>
           </a:p>
@@ -2296,7 +2296,7 @@
         <p:spPr>
           <a:xfrm>
             <a:off x="504000" y="226080"/>
-            <a:ext cx="9071280" cy="946080"/>
+            <a:ext cx="9070920" cy="945720"/>
           </a:xfrm>
           <a:prstGeom prst="rect">
             <a:avLst/>
@@ -2422,7 +2422,7 @@
         <p:spPr>
           <a:xfrm>
             <a:off x="630000" y="2318760"/>
-            <a:ext cx="11339640" cy="1194480"/>
+            <a:ext cx="11339280" cy="1194480"/>
           </a:xfrm>
           <a:prstGeom prst="rect">
             <a:avLst/>
@@ -2486,7 +2486,7 @@
         <p:txBody>
           <a:bodyPr/>
           <a:p>
-            <a:fld id="{B5D97104-0F87-44CC-9095-FBC249732F13}" type="slidenum">
+            <a:fld id="{71BEBA91-6E96-467F-B445-AAF8FD314775}" type="slidenum">
               <a:t>&lt;#&gt;</a:t>
             </a:fld>
           </a:p>
@@ -2548,7 +2548,7 @@
         <p:spPr>
           <a:xfrm>
             <a:off x="504000" y="226080"/>
-            <a:ext cx="9071280" cy="946080"/>
+            <a:ext cx="9070920" cy="945720"/>
           </a:xfrm>
           <a:prstGeom prst="rect">
             <a:avLst/>
@@ -2591,13 +2591,238 @@
             <a:spLocks noGrp="1"/>
           </p:cNvSpPr>
           <p:nvPr>
+            <p:ph type="body"/>
+          </p:nvPr>
+        </p:nvSpPr>
+        <p:spPr>
+          <a:xfrm>
+            <a:off x="630000" y="1010520"/>
+            <a:ext cx="11339280" cy="2504520"/>
+          </a:xfrm>
+          <a:prstGeom prst="rect">
+            <a:avLst/>
+          </a:prstGeom>
+          <a:noFill/>
+          <a:ln w="0">
+            <a:noFill/>
+          </a:ln>
+        </p:spPr>
+        <p:txBody>
+          <a:bodyPr lIns="0" rIns="0" tIns="0" bIns="0" anchor="t">
+            <a:normAutofit/>
+          </a:bodyPr>
+          <a:p>
+            <a:pPr marL="432000" indent="-324000">
+              <a:spcBef>
+                <a:spcPts val="1417"/>
+              </a:spcBef>
+              <a:buClr>
+                <a:srgbClr val="000000"/>
+              </a:buClr>
+              <a:buSzPct val="45000"/>
+              <a:buFont typeface="Wingdings" charset="2"/>
+              <a:buChar char=""/>
+            </a:pPr>
+            <a:r>
+              <a:rPr b="0" lang="pt-BR" sz="1800" spc="-1" strike="noStrike">
+                <a:solidFill>
+                  <a:srgbClr val="000000"/>
+                </a:solidFill>
+                <a:latin typeface="Arial"/>
+              </a:rPr>
+              <a:t>Clique para editar o formato de texto dos tópicos</a:t>
+            </a:r>
+            <a:endParaRPr b="0" lang="pt-BR" sz="1800" spc="-1" strike="noStrike">
+              <a:solidFill>
+                <a:srgbClr val="000000"/>
+              </a:solidFill>
+              <a:latin typeface="Arial"/>
+            </a:endParaRPr>
+          </a:p>
+          <a:p>
+            <a:pPr lvl="1" marL="864000" indent="-324000">
+              <a:spcBef>
+                <a:spcPts val="1134"/>
+              </a:spcBef>
+              <a:buClr>
+                <a:srgbClr val="000000"/>
+              </a:buClr>
+              <a:buSzPct val="75000"/>
+              <a:buFont typeface="Symbol" charset="2"/>
+              <a:buChar char=""/>
+            </a:pPr>
+            <a:r>
+              <a:rPr b="0" lang="pt-BR" sz="1800" spc="-1" strike="noStrike">
+                <a:solidFill>
+                  <a:srgbClr val="000000"/>
+                </a:solidFill>
+                <a:latin typeface="Arial"/>
+              </a:rPr>
+              <a:t>2.º nível de tópicos</a:t>
+            </a:r>
+            <a:endParaRPr b="0" lang="pt-BR" sz="1800" spc="-1" strike="noStrike">
+              <a:solidFill>
+                <a:srgbClr val="000000"/>
+              </a:solidFill>
+              <a:latin typeface="Arial"/>
+            </a:endParaRPr>
+          </a:p>
+          <a:p>
+            <a:pPr lvl="2" marL="1296000" indent="-288000">
+              <a:spcBef>
+                <a:spcPts val="850"/>
+              </a:spcBef>
+              <a:buClr>
+                <a:srgbClr val="000000"/>
+              </a:buClr>
+              <a:buSzPct val="45000"/>
+              <a:buFont typeface="Wingdings" charset="2"/>
+              <a:buChar char=""/>
+            </a:pPr>
+            <a:r>
+              <a:rPr b="0" lang="pt-BR" sz="1800" spc="-1" strike="noStrike">
+                <a:solidFill>
+                  <a:srgbClr val="000000"/>
+                </a:solidFill>
+                <a:latin typeface="Arial"/>
+              </a:rPr>
+              <a:t>3.º nível de tópicos</a:t>
+            </a:r>
+            <a:endParaRPr b="0" lang="pt-BR" sz="1800" spc="-1" strike="noStrike">
+              <a:solidFill>
+                <a:srgbClr val="000000"/>
+              </a:solidFill>
+              <a:latin typeface="Arial"/>
+            </a:endParaRPr>
+          </a:p>
+          <a:p>
+            <a:pPr lvl="3" marL="1728000" indent="-216000">
+              <a:spcBef>
+                <a:spcPts val="567"/>
+              </a:spcBef>
+              <a:buClr>
+                <a:srgbClr val="000000"/>
+              </a:buClr>
+              <a:buSzPct val="75000"/>
+              <a:buFont typeface="Symbol" charset="2"/>
+              <a:buChar char=""/>
+            </a:pPr>
+            <a:r>
+              <a:rPr b="0" lang="pt-BR" sz="1800" spc="-1" strike="noStrike">
+                <a:solidFill>
+                  <a:srgbClr val="000000"/>
+                </a:solidFill>
+                <a:latin typeface="Arial"/>
+              </a:rPr>
+              <a:t>4.º nível de tópicos</a:t>
+            </a:r>
+            <a:endParaRPr b="0" lang="pt-BR" sz="1800" spc="-1" strike="noStrike">
+              <a:solidFill>
+                <a:srgbClr val="000000"/>
+              </a:solidFill>
+              <a:latin typeface="Arial"/>
+            </a:endParaRPr>
+          </a:p>
+          <a:p>
+            <a:pPr lvl="4" marL="2160000" indent="-216000">
+              <a:spcBef>
+                <a:spcPts val="283"/>
+              </a:spcBef>
+              <a:buClr>
+                <a:srgbClr val="000000"/>
+              </a:buClr>
+              <a:buSzPct val="45000"/>
+              <a:buFont typeface="Wingdings" charset="2"/>
+              <a:buChar char=""/>
+            </a:pPr>
+            <a:r>
+              <a:rPr b="0" lang="pt-BR" sz="1800" spc="-1" strike="noStrike">
+                <a:solidFill>
+                  <a:srgbClr val="000000"/>
+                </a:solidFill>
+                <a:latin typeface="Arial"/>
+              </a:rPr>
+              <a:t>5.º nível de tópicos</a:t>
+            </a:r>
+            <a:endParaRPr b="0" lang="pt-BR" sz="1800" spc="-1" strike="noStrike">
+              <a:solidFill>
+                <a:srgbClr val="000000"/>
+              </a:solidFill>
+              <a:latin typeface="Arial"/>
+            </a:endParaRPr>
+          </a:p>
+          <a:p>
+            <a:pPr lvl="5" marL="2592000" indent="-216000">
+              <a:spcBef>
+                <a:spcPts val="283"/>
+              </a:spcBef>
+              <a:buClr>
+                <a:srgbClr val="000000"/>
+              </a:buClr>
+              <a:buSzPct val="45000"/>
+              <a:buFont typeface="Wingdings" charset="2"/>
+              <a:buChar char=""/>
+            </a:pPr>
+            <a:r>
+              <a:rPr b="0" lang="pt-BR" sz="1800" spc="-1" strike="noStrike">
+                <a:solidFill>
+                  <a:srgbClr val="000000"/>
+                </a:solidFill>
+                <a:latin typeface="Arial"/>
+              </a:rPr>
+              <a:t>6.º nível de tópicos</a:t>
+            </a:r>
+            <a:endParaRPr b="0" lang="pt-BR" sz="1800" spc="-1" strike="noStrike">
+              <a:solidFill>
+                <a:srgbClr val="000000"/>
+              </a:solidFill>
+              <a:latin typeface="Arial"/>
+            </a:endParaRPr>
+          </a:p>
+          <a:p>
+            <a:pPr lvl="6" marL="3024000" indent="-216000">
+              <a:spcBef>
+                <a:spcPts val="283"/>
+              </a:spcBef>
+              <a:buClr>
+                <a:srgbClr val="000000"/>
+              </a:buClr>
+              <a:buSzPct val="45000"/>
+              <a:buFont typeface="Wingdings" charset="2"/>
+              <a:buChar char=""/>
+            </a:pPr>
+            <a:r>
+              <a:rPr b="0" lang="pt-BR" sz="1800" spc="-1" strike="noStrike">
+                <a:solidFill>
+                  <a:srgbClr val="000000"/>
+                </a:solidFill>
+                <a:latin typeface="Arial"/>
+              </a:rPr>
+              <a:t>7.º nível de tópicos</a:t>
+            </a:r>
+            <a:endParaRPr b="0" lang="pt-BR" sz="1800" spc="-1" strike="noStrike">
+              <a:solidFill>
+                <a:srgbClr val="000000"/>
+              </a:solidFill>
+              <a:latin typeface="Arial"/>
+            </a:endParaRPr>
+          </a:p>
+        </p:txBody>
+      </p:sp>
+      <p:sp>
+        <p:nvSpPr>
+          <p:cNvPr id="2" name="PlaceHolder 3"/>
+          <p:cNvSpPr>
+            <a:spLocks noGrp="1"/>
+          </p:cNvSpPr>
+          <p:nvPr>
             <p:ph type="ftr" idx="1"/>
           </p:nvPr>
         </p:nvSpPr>
         <p:spPr>
           <a:xfrm>
             <a:off x="3447360" y="5165280"/>
-            <a:ext cx="3194640" cy="390240"/>
+            <a:ext cx="3194280" cy="389880"/>
           </a:xfrm>
           <a:prstGeom prst="rect">
             <a:avLst/>
@@ -2645,7 +2870,7 @@
                 </a:solidFill>
                 <a:latin typeface="Times New Roman"/>
               </a:rPr>
-              <a:t> </a:t>
+              <a:t>&lt;rodapé&gt;</a:t>
             </a:r>
             <a:endParaRPr b="0" lang="pt-BR" sz="1400" spc="-1" strike="noStrike">
               <a:solidFill>
@@ -2658,7 +2883,7 @@
       </p:sp>
       <p:sp>
         <p:nvSpPr>
-          <p:cNvPr id="2" name="PlaceHolder 3"/>
+          <p:cNvPr id="3" name="PlaceHolder 4"/>
           <p:cNvSpPr>
             <a:spLocks noGrp="1"/>
           </p:cNvSpPr>
@@ -2669,7 +2894,7 @@
         <p:spPr>
           <a:xfrm>
             <a:off x="7227360" y="5165280"/>
-            <a:ext cx="2347920" cy="390240"/>
+            <a:ext cx="2347560" cy="389880"/>
           </a:xfrm>
           <a:prstGeom prst="rect">
             <a:avLst/>
@@ -2710,14 +2935,14 @@
                 <a:tab algn="l" pos="0"/>
               </a:tabLst>
             </a:pPr>
-            <a:fld id="{FB7B9974-208B-4228-9F33-3787DF8F8A27}" type="slidenum">
+            <a:fld id="{C29646A8-3427-4B6D-A0C2-6D5430F18AC4}" type="slidenum">
               <a:rPr b="0" lang="pt-BR" sz="1400" spc="-1" strike="noStrike">
                 <a:solidFill>
                   <a:srgbClr val="000000"/>
                 </a:solidFill>
                 <a:latin typeface="Times New Roman"/>
               </a:rPr>
-              <a:t>1</a:t>
+              <a:t>&lt;número&gt;</a:t>
             </a:fld>
             <a:endParaRPr b="0" lang="pt-BR" sz="1400" spc="-1" strike="noStrike">
               <a:solidFill>
@@ -2730,7 +2955,7 @@
       </p:sp>
       <p:sp>
         <p:nvSpPr>
-          <p:cNvPr id="3" name="PlaceHolder 4"/>
+          <p:cNvPr id="4" name="PlaceHolder 5"/>
           <p:cNvSpPr>
             <a:spLocks noGrp="1"/>
           </p:cNvSpPr>
@@ -2741,7 +2966,7 @@
         <p:spPr>
           <a:xfrm>
             <a:off x="504000" y="5165280"/>
-            <a:ext cx="2347920" cy="390240"/>
+            <a:ext cx="2347560" cy="389880"/>
           </a:xfrm>
           <a:prstGeom prst="rect">
             <a:avLst/>
@@ -2777,238 +3002,13 @@
                 </a:solidFill>
                 <a:latin typeface="Times New Roman"/>
               </a:rPr>
-              <a:t> </a:t>
+              <a:t>&lt;data/hora&gt;</a:t>
             </a:r>
             <a:endParaRPr b="0" lang="pt-BR" sz="1400" spc="-1" strike="noStrike">
               <a:solidFill>
                 <a:srgbClr val="000000"/>
               </a:solidFill>
               <a:latin typeface="Times New Roman"/>
-            </a:endParaRPr>
-          </a:p>
-        </p:txBody>
-      </p:sp>
-      <p:sp>
-        <p:nvSpPr>
-          <p:cNvPr id="4" name="PlaceHolder 5"/>
-          <p:cNvSpPr>
-            <a:spLocks noGrp="1"/>
-          </p:cNvSpPr>
-          <p:nvPr>
-            <p:ph type="body"/>
-          </p:nvPr>
-        </p:nvSpPr>
-        <p:spPr>
-          <a:xfrm>
-            <a:off x="630000" y="1010520"/>
-            <a:ext cx="11339640" cy="2504880"/>
-          </a:xfrm>
-          <a:prstGeom prst="rect">
-            <a:avLst/>
-          </a:prstGeom>
-          <a:noFill/>
-          <a:ln w="0">
-            <a:noFill/>
-          </a:ln>
-        </p:spPr>
-        <p:txBody>
-          <a:bodyPr lIns="0" rIns="0" tIns="0" bIns="0" anchor="t">
-            <a:normAutofit fontScale="92000"/>
-          </a:bodyPr>
-          <a:p>
-            <a:pPr marL="397440" indent="-298080">
-              <a:spcBef>
-                <a:spcPts val="1417"/>
-              </a:spcBef>
-              <a:buClr>
-                <a:srgbClr val="000000"/>
-              </a:buClr>
-              <a:buSzPct val="45000"/>
-              <a:buFont typeface="Wingdings" charset="2"/>
-              <a:buChar char=""/>
-            </a:pPr>
-            <a:r>
-              <a:rPr b="0" lang="pt-BR" sz="3200" spc="-1" strike="noStrike">
-                <a:solidFill>
-                  <a:srgbClr val="000000"/>
-                </a:solidFill>
-                <a:latin typeface="Arial"/>
-              </a:rPr>
-              <a:t>Clique para editar o formato de texto dos tópicos</a:t>
-            </a:r>
-            <a:endParaRPr b="0" lang="pt-BR" sz="3200" spc="-1" strike="noStrike">
-              <a:solidFill>
-                <a:srgbClr val="000000"/>
-              </a:solidFill>
-              <a:latin typeface="Arial"/>
-            </a:endParaRPr>
-          </a:p>
-          <a:p>
-            <a:pPr lvl="1" marL="794880" indent="-298080">
-              <a:spcBef>
-                <a:spcPts val="1134"/>
-              </a:spcBef>
-              <a:buClr>
-                <a:srgbClr val="000000"/>
-              </a:buClr>
-              <a:buSzPct val="75000"/>
-              <a:buFont typeface="Symbol" charset="2"/>
-              <a:buChar char=""/>
-            </a:pPr>
-            <a:r>
-              <a:rPr b="0" lang="pt-BR" sz="2800" spc="-1" strike="noStrike">
-                <a:solidFill>
-                  <a:srgbClr val="000000"/>
-                </a:solidFill>
-                <a:latin typeface="Arial"/>
-              </a:rPr>
-              <a:t>2.º nível de tópicos</a:t>
-            </a:r>
-            <a:endParaRPr b="0" lang="pt-BR" sz="2800" spc="-1" strike="noStrike">
-              <a:solidFill>
-                <a:srgbClr val="000000"/>
-              </a:solidFill>
-              <a:latin typeface="Arial"/>
-            </a:endParaRPr>
-          </a:p>
-          <a:p>
-            <a:pPr lvl="2" marL="1192320" indent="-264960">
-              <a:spcBef>
-                <a:spcPts val="850"/>
-              </a:spcBef>
-              <a:buClr>
-                <a:srgbClr val="000000"/>
-              </a:buClr>
-              <a:buSzPct val="45000"/>
-              <a:buFont typeface="Wingdings" charset="2"/>
-              <a:buChar char=""/>
-            </a:pPr>
-            <a:r>
-              <a:rPr b="0" lang="pt-BR" sz="2400" spc="-1" strike="noStrike">
-                <a:solidFill>
-                  <a:srgbClr val="000000"/>
-                </a:solidFill>
-                <a:latin typeface="Arial"/>
-              </a:rPr>
-              <a:t>3.º nível de tópicos</a:t>
-            </a:r>
-            <a:endParaRPr b="0" lang="pt-BR" sz="2400" spc="-1" strike="noStrike">
-              <a:solidFill>
-                <a:srgbClr val="000000"/>
-              </a:solidFill>
-              <a:latin typeface="Arial"/>
-            </a:endParaRPr>
-          </a:p>
-          <a:p>
-            <a:pPr lvl="3" marL="1589760" indent="-198720">
-              <a:spcBef>
-                <a:spcPts val="567"/>
-              </a:spcBef>
-              <a:buClr>
-                <a:srgbClr val="000000"/>
-              </a:buClr>
-              <a:buSzPct val="75000"/>
-              <a:buFont typeface="Symbol" charset="2"/>
-              <a:buChar char=""/>
-            </a:pPr>
-            <a:r>
-              <a:rPr b="0" lang="pt-BR" sz="2000" spc="-1" strike="noStrike">
-                <a:solidFill>
-                  <a:srgbClr val="000000"/>
-                </a:solidFill>
-                <a:latin typeface="Arial"/>
-              </a:rPr>
-              <a:t>4.º nível de tópicos</a:t>
-            </a:r>
-            <a:endParaRPr b="0" lang="pt-BR" sz="2000" spc="-1" strike="noStrike">
-              <a:solidFill>
-                <a:srgbClr val="000000"/>
-              </a:solidFill>
-              <a:latin typeface="Arial"/>
-            </a:endParaRPr>
-          </a:p>
-          <a:p>
-            <a:pPr lvl="4" marL="1987200" indent="-198720">
-              <a:spcBef>
-                <a:spcPts val="283"/>
-              </a:spcBef>
-              <a:buClr>
-                <a:srgbClr val="000000"/>
-              </a:buClr>
-              <a:buSzPct val="45000"/>
-              <a:buFont typeface="Wingdings" charset="2"/>
-              <a:buChar char=""/>
-            </a:pPr>
-            <a:r>
-              <a:rPr b="0" lang="pt-BR" sz="2000" spc="-1" strike="noStrike">
-                <a:solidFill>
-                  <a:srgbClr val="000000"/>
-                </a:solidFill>
-                <a:latin typeface="Arial"/>
-              </a:rPr>
-              <a:t>5.º nível de tópicos</a:t>
-            </a:r>
-            <a:endParaRPr b="0" lang="pt-BR" sz="2000" spc="-1" strike="noStrike">
-              <a:solidFill>
-                <a:srgbClr val="000000"/>
-              </a:solidFill>
-              <a:latin typeface="Arial"/>
-            </a:endParaRPr>
-          </a:p>
-          <a:p>
-            <a:pPr lvl="5" marL="2384640" indent="-198720">
-              <a:spcBef>
-                <a:spcPts val="283"/>
-              </a:spcBef>
-              <a:buClr>
-                <a:srgbClr val="000000"/>
-              </a:buClr>
-              <a:buSzPct val="45000"/>
-              <a:buFont typeface="Wingdings" charset="2"/>
-              <a:buChar char=""/>
-            </a:pPr>
-            <a:r>
-              <a:rPr b="0" lang="pt-BR" sz="2000" spc="-1" strike="noStrike">
-                <a:solidFill>
-                  <a:srgbClr val="000000"/>
-                </a:solidFill>
-                <a:latin typeface="Arial"/>
-              </a:rPr>
-              <a:t>6.º nível de tópicos</a:t>
-            </a:r>
-            <a:endParaRPr b="0" lang="pt-BR" sz="2000" spc="-1" strike="noStrike">
-              <a:solidFill>
-                <a:srgbClr val="000000"/>
-              </a:solidFill>
-              <a:latin typeface="Arial"/>
-            </a:endParaRPr>
-          </a:p>
-          <a:p>
-            <a:pPr lvl="6" marL="2782080" indent="-198720">
-              <a:spcBef>
-                <a:spcPts val="283"/>
-              </a:spcBef>
-              <a:buClr>
-                <a:srgbClr val="000000"/>
-              </a:buClr>
-              <a:buSzPct val="45000"/>
-              <a:buFont typeface="Wingdings" charset="2"/>
-              <a:buChar char=""/>
-            </a:pPr>
-            <a:r>
-              <a:rPr b="0" lang="pt-BR" sz="2000" spc="-1" strike="noStrike">
-                <a:solidFill>
-                  <a:srgbClr val="000000"/>
-                </a:solidFill>
-                <a:latin typeface="Arial"/>
-              </a:rPr>
-              <a:t>7.º nível de tópicos</a:t>
-            </a:r>
-            <a:endParaRPr b="0" lang="pt-BR" sz="2000" spc="-1" strike="noStrike">
-              <a:solidFill>
-                <a:srgbClr val="000000"/>
-              </a:solidFill>
-              <a:latin typeface="Arial"/>
             </a:endParaRPr>
           </a:p>
         </p:txBody>
@@ -3059,7 +3059,7 @@
         <p:spPr>
           <a:xfrm>
             <a:off x="1116000" y="2052000"/>
-            <a:ext cx="10728000" cy="0"/>
+            <a:ext cx="10728000" cy="360"/>
           </a:xfrm>
           <a:prstGeom prst="line">
             <a:avLst/>
@@ -3088,6 +3088,7 @@
                 <a:srgbClr val="000000"/>
               </a:solidFill>
               <a:latin typeface="Arial"/>
+              <a:ea typeface="DejaVu Sans"/>
             </a:endParaRPr>
           </a:p>
         </p:txBody>
@@ -3095,29 +3096,40 @@
       <p:sp>
         <p:nvSpPr>
           <p:cNvPr id="42" name=""/>
-          <p:cNvSpPr txBox="1"/>
+          <p:cNvSpPr/>
           <p:nvPr/>
         </p:nvSpPr>
         <p:spPr>
           <a:xfrm>
-            <a:off x="720000" y="474120"/>
-            <a:ext cx="1980000" cy="785880"/>
-          </a:xfrm>
-          <a:prstGeom prst="rect">
-            <a:avLst/>
-          </a:prstGeom>
-          <a:noFill/>
-          <a:ln w="0">
-            <a:noFill/>
-          </a:ln>
-        </p:spPr>
+            <a:off x="540000" y="474120"/>
+            <a:ext cx="2160000" cy="785520"/>
+          </a:xfrm>
+          <a:prstGeom prst="rect">
+            <a:avLst/>
+          </a:prstGeom>
+          <a:noFill/>
+          <a:ln w="0">
+            <a:noFill/>
+          </a:ln>
+        </p:spPr>
+        <p:style>
+          <a:lnRef idx="0"/>
+          <a:fillRef idx="0"/>
+          <a:effectRef idx="0"/>
+          <a:fontRef idx="minor"/>
+        </p:style>
         <p:txBody>
           <a:bodyPr lIns="90000" rIns="90000" tIns="45000" bIns="45000" anchor="t">
             <a:noAutofit/>
           </a:bodyPr>
           <a:p>
-            <a:r>
-              <a:rPr b="0" lang="pt-BR" sz="1300" spc="-1" strike="noStrike">
+            <a:pPr>
+              <a:lnSpc>
+                <a:spcPct val="100000"/>
+              </a:lnSpc>
+            </a:pPr>
+            <a:r>
+              <a:rPr b="0" lang="pt-BR" sz="1400" spc="-1" strike="noStrike">
                 <a:solidFill>
                   <a:srgbClr val="000000"/>
                 </a:solidFill>
@@ -3125,11 +3137,11 @@
               </a:rPr>
               <a:t>Our colleague renamed the first Python notebook in production</a:t>
             </a:r>
-            <a:endParaRPr b="0" lang="pt-BR" sz="1300" spc="-1" strike="noStrike">
-              <a:solidFill>
-                <a:srgbClr val="000000"/>
-              </a:solidFill>
-              <a:latin typeface="Inconsolata"/>
+            <a:endParaRPr b="0" lang="pt-BR" sz="1400" spc="-1" strike="noStrike">
+              <a:solidFill>
+                <a:srgbClr val="000000"/>
+              </a:solidFill>
+              <a:latin typeface="Arial"/>
             </a:endParaRPr>
           </a:p>
         </p:txBody>
@@ -3172,6 +3184,7 @@
                 <a:srgbClr val="000000"/>
               </a:solidFill>
               <a:latin typeface="Arial"/>
+              <a:ea typeface="DejaVu Sans"/>
             </a:endParaRPr>
           </a:p>
         </p:txBody>
@@ -3179,28 +3192,197 @@
       <p:sp>
         <p:nvSpPr>
           <p:cNvPr id="44" name=""/>
-          <p:cNvSpPr txBox="1"/>
+          <p:cNvSpPr/>
           <p:nvPr/>
         </p:nvSpPr>
         <p:spPr>
           <a:xfrm>
-            <a:off x="10404000" y="2219400"/>
-            <a:ext cx="1620000" cy="276120"/>
-          </a:xfrm>
-          <a:prstGeom prst="rect">
-            <a:avLst/>
-          </a:prstGeom>
-          <a:noFill/>
-          <a:ln w="0">
-            <a:noFill/>
-          </a:ln>
-        </p:spPr>
+            <a:off x="10368000" y="2219400"/>
+            <a:ext cx="1619640" cy="275760"/>
+          </a:xfrm>
+          <a:prstGeom prst="rect">
+            <a:avLst/>
+          </a:prstGeom>
+          <a:noFill/>
+          <a:ln w="0">
+            <a:noFill/>
+          </a:ln>
+        </p:spPr>
+        <p:style>
+          <a:lnRef idx="0"/>
+          <a:fillRef idx="0"/>
+          <a:effectRef idx="0"/>
+          <a:fontRef idx="minor"/>
+        </p:style>
         <p:txBody>
           <a:bodyPr lIns="90000" rIns="90000" tIns="45000" bIns="45000" anchor="ctr">
             <a:noAutofit/>
           </a:bodyPr>
           <a:p>
-            <a:pPr algn="ctr"/>
+            <a:pPr algn="ctr">
+              <a:lnSpc>
+                <a:spcPct val="100000"/>
+              </a:lnSpc>
+            </a:pPr>
+            <a:r>
+              <a:rPr b="0" lang="pt-BR" sz="1500" spc="-1" strike="noStrike">
+                <a:solidFill>
+                  <a:srgbClr val="000000"/>
+                </a:solidFill>
+                <a:latin typeface="Inconsolata"/>
+              </a:rPr>
+              <a:t>Time (in days)</a:t>
+            </a:r>
+            <a:endParaRPr b="0" lang="pt-BR" sz="1500" spc="-1" strike="noStrike">
+              <a:solidFill>
+                <a:srgbClr val="000000"/>
+              </a:solidFill>
+              <a:latin typeface="Arial"/>
+            </a:endParaRPr>
+          </a:p>
+        </p:txBody>
+      </p:sp>
+      <p:sp>
+        <p:nvSpPr>
+          <p:cNvPr id="45" name=""/>
+          <p:cNvSpPr/>
+          <p:nvPr/>
+        </p:nvSpPr>
+        <p:spPr>
+          <a:xfrm>
+            <a:off x="864000" y="2124000"/>
+            <a:ext cx="539640" cy="275760"/>
+          </a:xfrm>
+          <a:prstGeom prst="rect">
+            <a:avLst/>
+          </a:prstGeom>
+          <a:noFill/>
+          <a:ln w="0">
+            <a:noFill/>
+          </a:ln>
+        </p:spPr>
+        <p:style>
+          <a:lnRef idx="0"/>
+          <a:fillRef idx="0"/>
+          <a:effectRef idx="0"/>
+          <a:fontRef idx="minor"/>
+        </p:style>
+        <p:txBody>
+          <a:bodyPr lIns="90000" rIns="90000" tIns="45000" bIns="45000" anchor="ctr">
+            <a:noAutofit/>
+          </a:bodyPr>
+          <a:p>
+            <a:pPr algn="ctr">
+              <a:lnSpc>
+                <a:spcPct val="100000"/>
+              </a:lnSpc>
+            </a:pPr>
+            <a:r>
+              <a:rPr b="0" lang="pt-BR" sz="1500" spc="-1" strike="noStrike">
+                <a:solidFill>
+                  <a:srgbClr val="000000"/>
+                </a:solidFill>
+                <a:latin typeface="Inconsolata"/>
+              </a:rPr>
+              <a:t>0</a:t>
+            </a:r>
+            <a:endParaRPr b="0" lang="pt-BR" sz="1500" spc="-1" strike="noStrike">
+              <a:solidFill>
+                <a:srgbClr val="000000"/>
+              </a:solidFill>
+              <a:latin typeface="Arial"/>
+            </a:endParaRPr>
+          </a:p>
+        </p:txBody>
+      </p:sp>
+      <p:sp>
+        <p:nvSpPr>
+          <p:cNvPr id="46" name=""/>
+          <p:cNvSpPr/>
+          <p:nvPr/>
+        </p:nvSpPr>
+        <p:spPr>
+          <a:xfrm>
+            <a:off x="2052000" y="2124000"/>
+            <a:ext cx="539640" cy="275760"/>
+          </a:xfrm>
+          <a:prstGeom prst="rect">
+            <a:avLst/>
+          </a:prstGeom>
+          <a:noFill/>
+          <a:ln w="0">
+            <a:noFill/>
+          </a:ln>
+        </p:spPr>
+        <p:style>
+          <a:lnRef idx="0"/>
+          <a:fillRef idx="0"/>
+          <a:effectRef idx="0"/>
+          <a:fontRef idx="minor"/>
+        </p:style>
+        <p:txBody>
+          <a:bodyPr lIns="90000" rIns="90000" tIns="45000" bIns="45000" anchor="ctr">
+            <a:noAutofit/>
+          </a:bodyPr>
+          <a:p>
+            <a:pPr algn="ctr">
+              <a:lnSpc>
+                <a:spcPct val="100000"/>
+              </a:lnSpc>
+            </a:pPr>
+            <a:r>
+              <a:rPr b="0" lang="pt-BR" sz="1500" spc="-1" strike="noStrike">
+                <a:solidFill>
+                  <a:srgbClr val="000000"/>
+                </a:solidFill>
+                <a:latin typeface="Inconsolata"/>
+              </a:rPr>
+              <a:t>5</a:t>
+            </a:r>
+            <a:endParaRPr b="0" lang="pt-BR" sz="1500" spc="-1" strike="noStrike">
+              <a:solidFill>
+                <a:srgbClr val="000000"/>
+              </a:solidFill>
+              <a:latin typeface="Arial"/>
+            </a:endParaRPr>
+          </a:p>
+        </p:txBody>
+      </p:sp>
+      <p:sp>
+        <p:nvSpPr>
+          <p:cNvPr id="47" name=""/>
+          <p:cNvSpPr/>
+          <p:nvPr/>
+        </p:nvSpPr>
+        <p:spPr>
+          <a:xfrm>
+            <a:off x="1296000" y="2880000"/>
+            <a:ext cx="2375640" cy="1211400"/>
+          </a:xfrm>
+          <a:prstGeom prst="rect">
+            <a:avLst/>
+          </a:prstGeom>
+          <a:noFill/>
+          <a:ln w="0">
+            <a:noFill/>
+          </a:ln>
+        </p:spPr>
+        <p:style>
+          <a:lnRef idx="0"/>
+          <a:fillRef idx="0"/>
+          <a:effectRef idx="0"/>
+          <a:fontRef idx="minor"/>
+        </p:style>
+        <p:txBody>
+          <a:bodyPr lIns="90000" rIns="90000" tIns="45000" bIns="45000" anchor="t">
+            <a:noAutofit/>
+          </a:bodyPr>
+          <a:p>
+            <a:pPr>
+              <a:lnSpc>
+                <a:spcPct val="100000"/>
+              </a:lnSpc>
+            </a:pPr>
             <a:r>
               <a:rPr b="0" lang="pt-BR" sz="1400" spc="-1" strike="noStrike">
                 <a:solidFill>
@@ -3208,42 +3390,148 @@
                 </a:solidFill>
                 <a:latin typeface="Inconsolata"/>
               </a:rPr>
-              <a:t>Time (in days)</a:t>
+              <a:t>I discovered the pipeline raising a “notebook not found” error, and intentionally deleted this pipeline</a:t>
             </a:r>
             <a:endParaRPr b="0" lang="pt-BR" sz="1400" spc="-1" strike="noStrike">
               <a:solidFill>
                 <a:srgbClr val="000000"/>
               </a:solidFill>
-              <a:latin typeface="Inconsolata"/>
-            </a:endParaRPr>
-          </a:p>
-        </p:txBody>
-      </p:sp>
-      <p:sp>
-        <p:nvSpPr>
-          <p:cNvPr id="45" name=""/>
-          <p:cNvSpPr txBox="1"/>
+              <a:latin typeface="Arial"/>
+            </a:endParaRPr>
+          </a:p>
+        </p:txBody>
+      </p:sp>
+      <p:sp>
+        <p:nvSpPr>
+          <p:cNvPr id="48" name=""/>
+          <p:cNvSpPr/>
           <p:nvPr/>
         </p:nvSpPr>
         <p:spPr>
-          <a:xfrm>
-            <a:off x="864000" y="2124000"/>
-            <a:ext cx="540000" cy="276120"/>
-          </a:xfrm>
-          <a:prstGeom prst="rect">
-            <a:avLst/>
-          </a:prstGeom>
-          <a:noFill/>
-          <a:ln w="0">
-            <a:noFill/>
-          </a:ln>
-        </p:spPr>
+          <a:xfrm flipV="1">
+            <a:off x="2232000" y="2374200"/>
+            <a:ext cx="72000" cy="469800"/>
+          </a:xfrm>
+          <a:prstGeom prst="line">
+            <a:avLst/>
+          </a:prstGeom>
+          <a:ln w="36000">
+            <a:solidFill>
+              <a:srgbClr val="000000"/>
+            </a:solidFill>
+            <a:round/>
+            <a:tailEnd len="med" type="triangle" w="med"/>
+          </a:ln>
+        </p:spPr>
+        <p:style>
+          <a:lnRef idx="0"/>
+          <a:fillRef idx="0"/>
+          <a:effectRef idx="0"/>
+          <a:fontRef idx="minor"/>
+        </p:style>
+        <p:txBody>
+          <a:bodyPr lIns="108000" rIns="108000" tIns="63000" bIns="63000" anchor="ctr">
+            <a:noAutofit/>
+          </a:bodyPr>
+          <a:p>
+            <a:endParaRPr b="0" lang="pt-BR" sz="1800" spc="-1" strike="noStrike">
+              <a:solidFill>
+                <a:srgbClr val="000000"/>
+              </a:solidFill>
+              <a:latin typeface="Arial"/>
+              <a:ea typeface="DejaVu Sans"/>
+            </a:endParaRPr>
+          </a:p>
+        </p:txBody>
+      </p:sp>
+      <p:sp>
+        <p:nvSpPr>
+          <p:cNvPr id="49" name=""/>
+          <p:cNvSpPr/>
+          <p:nvPr/>
+        </p:nvSpPr>
+        <p:spPr>
+          <a:xfrm>
+            <a:off x="5544000" y="2124360"/>
+            <a:ext cx="539640" cy="275760"/>
+          </a:xfrm>
+          <a:prstGeom prst="rect">
+            <a:avLst/>
+          </a:prstGeom>
+          <a:noFill/>
+          <a:ln w="0">
+            <a:noFill/>
+          </a:ln>
+        </p:spPr>
+        <p:style>
+          <a:lnRef idx="0"/>
+          <a:fillRef idx="0"/>
+          <a:effectRef idx="0"/>
+          <a:fontRef idx="minor"/>
+        </p:style>
         <p:txBody>
           <a:bodyPr lIns="90000" rIns="90000" tIns="45000" bIns="45000" anchor="ctr">
             <a:noAutofit/>
           </a:bodyPr>
           <a:p>
-            <a:pPr algn="ctr"/>
+            <a:pPr algn="ctr">
+              <a:lnSpc>
+                <a:spcPct val="100000"/>
+              </a:lnSpc>
+            </a:pPr>
+            <a:r>
+              <a:rPr b="0" lang="pt-BR" sz="1500" spc="-1" strike="noStrike">
+                <a:solidFill>
+                  <a:srgbClr val="000000"/>
+                </a:solidFill>
+                <a:latin typeface="Inconsolata"/>
+              </a:rPr>
+              <a:t>15</a:t>
+            </a:r>
+            <a:endParaRPr b="0" lang="pt-BR" sz="1500" spc="-1" strike="noStrike">
+              <a:solidFill>
+                <a:srgbClr val="000000"/>
+              </a:solidFill>
+              <a:latin typeface="Arial"/>
+            </a:endParaRPr>
+          </a:p>
+        </p:txBody>
+      </p:sp>
+      <p:sp>
+        <p:nvSpPr>
+          <p:cNvPr id="50" name=""/>
+          <p:cNvSpPr/>
+          <p:nvPr/>
+        </p:nvSpPr>
+        <p:spPr>
+          <a:xfrm>
+            <a:off x="4356000" y="324000"/>
+            <a:ext cx="2375640" cy="1133280"/>
+          </a:xfrm>
+          <a:prstGeom prst="rect">
+            <a:avLst/>
+          </a:prstGeom>
+          <a:noFill/>
+          <a:ln w="0">
+            <a:noFill/>
+          </a:ln>
+        </p:spPr>
+        <p:style>
+          <a:lnRef idx="0"/>
+          <a:fillRef idx="0"/>
+          <a:effectRef idx="0"/>
+          <a:fontRef idx="minor"/>
+        </p:style>
+        <p:txBody>
+          <a:bodyPr lIns="90000" rIns="90000" tIns="45000" bIns="45000" anchor="t">
+            <a:noAutofit/>
+          </a:bodyPr>
+          <a:p>
+            <a:pPr>
+              <a:lnSpc>
+                <a:spcPct val="100000"/>
+              </a:lnSpc>
+            </a:pPr>
             <a:r>
               <a:rPr b="0" lang="pt-BR" sz="1400" spc="-1" strike="noStrike">
                 <a:solidFill>
@@ -3251,42 +3539,95 @@
                 </a:solidFill>
                 <a:latin typeface="Inconsolata"/>
               </a:rPr>
-              <a:t>0</a:t>
+              <a:t>Client reported that he was not receiving the files, and we started our investigation</a:t>
             </a:r>
             <a:endParaRPr b="0" lang="pt-BR" sz="1400" spc="-1" strike="noStrike">
               <a:solidFill>
                 <a:srgbClr val="000000"/>
               </a:solidFill>
-              <a:latin typeface="Inconsolata"/>
-            </a:endParaRPr>
-          </a:p>
-        </p:txBody>
-      </p:sp>
-      <p:sp>
-        <p:nvSpPr>
-          <p:cNvPr id="46" name=""/>
-          <p:cNvSpPr txBox="1"/>
+              <a:latin typeface="Arial"/>
+            </a:endParaRPr>
+          </a:p>
+        </p:txBody>
+      </p:sp>
+      <p:sp>
+        <p:nvSpPr>
+          <p:cNvPr id="51" name=""/>
+          <p:cNvSpPr/>
           <p:nvPr/>
         </p:nvSpPr>
         <p:spPr>
           <a:xfrm>
-            <a:off x="2052000" y="2124000"/>
-            <a:ext cx="540000" cy="276120"/>
-          </a:xfrm>
-          <a:prstGeom prst="rect">
-            <a:avLst/>
-          </a:prstGeom>
-          <a:noFill/>
-          <a:ln w="0">
-            <a:noFill/>
-          </a:ln>
-        </p:spPr>
-        <p:txBody>
-          <a:bodyPr lIns="90000" rIns="90000" tIns="45000" bIns="45000" anchor="ctr">
+            <a:off x="5508000" y="1332000"/>
+            <a:ext cx="180000" cy="540000"/>
+          </a:xfrm>
+          <a:prstGeom prst="line">
+            <a:avLst/>
+          </a:prstGeom>
+          <a:ln w="36000">
+            <a:solidFill>
+              <a:srgbClr val="000000"/>
+            </a:solidFill>
+            <a:round/>
+            <a:tailEnd len="med" type="triangle" w="med"/>
+          </a:ln>
+        </p:spPr>
+        <p:style>
+          <a:lnRef idx="0"/>
+          <a:fillRef idx="0"/>
+          <a:effectRef idx="0"/>
+          <a:fontRef idx="minor"/>
+        </p:style>
+        <p:txBody>
+          <a:bodyPr lIns="108000" rIns="108000" tIns="63000" bIns="63000" anchor="ctr">
             <a:noAutofit/>
           </a:bodyPr>
           <a:p>
-            <a:pPr algn="ctr"/>
+            <a:endParaRPr b="0" lang="pt-BR" sz="1800" spc="-1" strike="noStrike">
+              <a:solidFill>
+                <a:srgbClr val="000000"/>
+              </a:solidFill>
+              <a:latin typeface="Arial"/>
+              <a:ea typeface="DejaVu Sans"/>
+            </a:endParaRPr>
+          </a:p>
+        </p:txBody>
+      </p:sp>
+      <p:sp>
+        <p:nvSpPr>
+          <p:cNvPr id="52" name=""/>
+          <p:cNvSpPr/>
+          <p:nvPr/>
+        </p:nvSpPr>
+        <p:spPr>
+          <a:xfrm>
+            <a:off x="5040000" y="2952000"/>
+            <a:ext cx="2700000" cy="1307160"/>
+          </a:xfrm>
+          <a:prstGeom prst="rect">
+            <a:avLst/>
+          </a:prstGeom>
+          <a:noFill/>
+          <a:ln w="0">
+            <a:noFill/>
+          </a:ln>
+        </p:spPr>
+        <p:style>
+          <a:lnRef idx="0"/>
+          <a:fillRef idx="0"/>
+          <a:effectRef idx="0"/>
+          <a:fontRef idx="minor"/>
+        </p:style>
+        <p:txBody>
+          <a:bodyPr lIns="90000" rIns="90000" tIns="45000" bIns="45000" anchor="t">
+            <a:noAutofit/>
+          </a:bodyPr>
+          <a:p>
+            <a:pPr>
+              <a:lnSpc>
+                <a:spcPct val="100000"/>
+              </a:lnSpc>
+            </a:pPr>
             <a:r>
               <a:rPr b="0" lang="pt-BR" sz="1400" spc="-1" strike="noStrike">
                 <a:solidFill>
@@ -3294,69 +3635,27 @@
                 </a:solidFill>
                 <a:latin typeface="Inconsolata"/>
               </a:rPr>
-              <a:t>5</a:t>
+              <a:t>We recovered the data pipeline that was missing. But we did not understand why the Python notebook disappeared.</a:t>
             </a:r>
             <a:endParaRPr b="0" lang="pt-BR" sz="1400" spc="-1" strike="noStrike">
               <a:solidFill>
                 <a:srgbClr val="000000"/>
               </a:solidFill>
-              <a:latin typeface="Inconsolata"/>
-            </a:endParaRPr>
-          </a:p>
-        </p:txBody>
-      </p:sp>
-      <p:sp>
-        <p:nvSpPr>
-          <p:cNvPr id="47" name=""/>
-          <p:cNvSpPr txBox="1"/>
-          <p:nvPr/>
-        </p:nvSpPr>
-        <p:spPr>
-          <a:xfrm>
-            <a:off x="1296000" y="2880000"/>
-            <a:ext cx="2376000" cy="1211760"/>
-          </a:xfrm>
-          <a:prstGeom prst="rect">
-            <a:avLst/>
-          </a:prstGeom>
-          <a:noFill/>
-          <a:ln w="0">
-            <a:noFill/>
-          </a:ln>
-        </p:spPr>
-        <p:txBody>
-          <a:bodyPr lIns="90000" rIns="90000" tIns="45000" bIns="45000" anchor="t">
-            <a:noAutofit/>
-          </a:bodyPr>
-          <a:p>
-            <a:r>
-              <a:rPr b="0" lang="pt-BR" sz="1300" spc="-1" strike="noStrike">
-                <a:solidFill>
-                  <a:srgbClr val="000000"/>
-                </a:solidFill>
-                <a:latin typeface="Inconsolata"/>
-              </a:rPr>
-              <a:t>I discovered the pipeline raising a “notebook not found” error, and intentionally deleted this pipeline</a:t>
-            </a:r>
-            <a:endParaRPr b="0" lang="pt-BR" sz="1300" spc="-1" strike="noStrike">
-              <a:solidFill>
-                <a:srgbClr val="000000"/>
-              </a:solidFill>
-              <a:latin typeface="Inconsolata"/>
-            </a:endParaRPr>
-          </a:p>
-        </p:txBody>
-      </p:sp>
-      <p:sp>
-        <p:nvSpPr>
-          <p:cNvPr id="48" name=""/>
+              <a:latin typeface="Arial"/>
+            </a:endParaRPr>
+          </a:p>
+        </p:txBody>
+      </p:sp>
+      <p:sp>
+        <p:nvSpPr>
+          <p:cNvPr id="53" name=""/>
           <p:cNvSpPr/>
           <p:nvPr/>
         </p:nvSpPr>
         <p:spPr>
-          <a:xfrm flipV="1">
-            <a:off x="2232000" y="2374200"/>
-            <a:ext cx="72000" cy="469800"/>
+          <a:xfrm flipH="1" flipV="1">
+            <a:off x="5895000" y="2416320"/>
+            <a:ext cx="181440" cy="507960"/>
           </a:xfrm>
           <a:prstGeom prst="line">
             <a:avLst/>
@@ -3385,35 +3684,99 @@
                 <a:srgbClr val="000000"/>
               </a:solidFill>
               <a:latin typeface="Arial"/>
-            </a:endParaRPr>
-          </a:p>
-        </p:txBody>
-      </p:sp>
-      <p:sp>
-        <p:nvSpPr>
-          <p:cNvPr id="49" name=""/>
-          <p:cNvSpPr txBox="1"/>
+              <a:ea typeface="DejaVu Sans"/>
+            </a:endParaRPr>
+          </a:p>
+        </p:txBody>
+      </p:sp>
+      <p:sp>
+        <p:nvSpPr>
+          <p:cNvPr id="54" name=""/>
+          <p:cNvSpPr/>
           <p:nvPr/>
         </p:nvSpPr>
         <p:spPr>
           <a:xfrm>
-            <a:off x="5544000" y="2124360"/>
-            <a:ext cx="540000" cy="276120"/>
-          </a:xfrm>
-          <a:prstGeom prst="rect">
-            <a:avLst/>
-          </a:prstGeom>
-          <a:noFill/>
-          <a:ln w="0">
-            <a:noFill/>
-          </a:ln>
-        </p:spPr>
+            <a:off x="7848000" y="2135880"/>
+            <a:ext cx="539640" cy="275760"/>
+          </a:xfrm>
+          <a:prstGeom prst="rect">
+            <a:avLst/>
+          </a:prstGeom>
+          <a:noFill/>
+          <a:ln w="0">
+            <a:noFill/>
+          </a:ln>
+        </p:spPr>
+        <p:style>
+          <a:lnRef idx="0"/>
+          <a:fillRef idx="0"/>
+          <a:effectRef idx="0"/>
+          <a:fontRef idx="minor"/>
+        </p:style>
         <p:txBody>
           <a:bodyPr lIns="90000" rIns="90000" tIns="45000" bIns="45000" anchor="ctr">
             <a:noAutofit/>
           </a:bodyPr>
           <a:p>
-            <a:pPr algn="ctr"/>
+            <a:pPr algn="ctr">
+              <a:lnSpc>
+                <a:spcPct val="100000"/>
+              </a:lnSpc>
+            </a:pPr>
+            <a:r>
+              <a:rPr b="0" lang="pt-BR" sz="1500" spc="-1" strike="noStrike">
+                <a:solidFill>
+                  <a:srgbClr val="000000"/>
+                </a:solidFill>
+                <a:latin typeface="Inconsolata"/>
+              </a:rPr>
+              <a:t>21</a:t>
+            </a:r>
+            <a:endParaRPr b="0" lang="pt-BR" sz="1500" spc="-1" strike="noStrike">
+              <a:solidFill>
+                <a:srgbClr val="000000"/>
+              </a:solidFill>
+              <a:latin typeface="Arial"/>
+            </a:endParaRPr>
+          </a:p>
+        </p:txBody>
+      </p:sp>
+      <p:sp>
+        <p:nvSpPr>
+          <p:cNvPr id="55" name=""/>
+          <p:cNvSpPr/>
+          <p:nvPr/>
+        </p:nvSpPr>
+        <p:spPr>
+          <a:xfrm>
+            <a:off x="7272000" y="280440"/>
+            <a:ext cx="2088000" cy="871200"/>
+          </a:xfrm>
+          <a:prstGeom prst="rect">
+            <a:avLst/>
+          </a:prstGeom>
+          <a:noFill/>
+          <a:ln w="0">
+            <a:noFill/>
+          </a:ln>
+        </p:spPr>
+        <p:style>
+          <a:lnRef idx="0"/>
+          <a:fillRef idx="0"/>
+          <a:effectRef idx="0"/>
+          <a:fontRef idx="minor"/>
+        </p:style>
+        <p:txBody>
+          <a:bodyPr lIns="90000" rIns="90000" tIns="45000" bIns="45000" anchor="t">
+            <a:noAutofit/>
+          </a:bodyPr>
+          <a:p>
+            <a:pPr>
+              <a:lnSpc>
+                <a:spcPct val="100000"/>
+              </a:lnSpc>
+            </a:pPr>
             <a:r>
               <a:rPr b="0" lang="pt-BR" sz="1400" spc="-1" strike="noStrike">
                 <a:solidFill>
@@ -3421,68 +3784,26 @@
                 </a:solidFill>
                 <a:latin typeface="Inconsolata"/>
               </a:rPr>
-              <a:t>15</a:t>
+              <a:t>Our colleague renamed several Python notebooks in production</a:t>
             </a:r>
             <a:endParaRPr b="0" lang="pt-BR" sz="1400" spc="-1" strike="noStrike">
               <a:solidFill>
                 <a:srgbClr val="000000"/>
               </a:solidFill>
-              <a:latin typeface="Inconsolata"/>
-            </a:endParaRPr>
-          </a:p>
-        </p:txBody>
-      </p:sp>
-      <p:sp>
-        <p:nvSpPr>
-          <p:cNvPr id="50" name=""/>
-          <p:cNvSpPr txBox="1"/>
-          <p:nvPr/>
-        </p:nvSpPr>
-        <p:spPr>
-          <a:xfrm>
-            <a:off x="4356000" y="432000"/>
-            <a:ext cx="2340000" cy="1133640"/>
-          </a:xfrm>
-          <a:prstGeom prst="rect">
-            <a:avLst/>
-          </a:prstGeom>
-          <a:noFill/>
-          <a:ln w="0">
-            <a:noFill/>
-          </a:ln>
-        </p:spPr>
-        <p:txBody>
-          <a:bodyPr lIns="90000" rIns="90000" tIns="45000" bIns="45000" anchor="t">
-            <a:noAutofit/>
-          </a:bodyPr>
-          <a:p>
-            <a:r>
-              <a:rPr b="0" lang="pt-BR" sz="1300" spc="-1" strike="noStrike">
-                <a:solidFill>
-                  <a:srgbClr val="000000"/>
-                </a:solidFill>
-                <a:latin typeface="Inconsolata"/>
-              </a:rPr>
-              <a:t>Client reported that he was not receiving the files, and we started our investigation</a:t>
-            </a:r>
-            <a:endParaRPr b="0" lang="pt-BR" sz="1300" spc="-1" strike="noStrike">
-              <a:solidFill>
-                <a:srgbClr val="000000"/>
-              </a:solidFill>
-              <a:latin typeface="Inconsolata"/>
-            </a:endParaRPr>
-          </a:p>
-        </p:txBody>
-      </p:sp>
-      <p:sp>
-        <p:nvSpPr>
-          <p:cNvPr id="51" name=""/>
+              <a:latin typeface="Arial"/>
+            </a:endParaRPr>
+          </a:p>
+        </p:txBody>
+      </p:sp>
+      <p:sp>
+        <p:nvSpPr>
+          <p:cNvPr id="56" name=""/>
           <p:cNvSpPr/>
           <p:nvPr/>
         </p:nvSpPr>
         <p:spPr>
           <a:xfrm>
-            <a:off x="5508000" y="1332000"/>
+            <a:off x="7776000" y="1296000"/>
             <a:ext cx="180000" cy="540000"/>
           </a:xfrm>
           <a:prstGeom prst="line">
@@ -3512,62 +3833,74 @@
                 <a:srgbClr val="000000"/>
               </a:solidFill>
               <a:latin typeface="Arial"/>
-            </a:endParaRPr>
-          </a:p>
-        </p:txBody>
-      </p:sp>
-      <p:sp>
-        <p:nvSpPr>
-          <p:cNvPr id="52" name=""/>
-          <p:cNvSpPr txBox="1"/>
+              <a:ea typeface="DejaVu Sans"/>
+            </a:endParaRPr>
+          </a:p>
+        </p:txBody>
+      </p:sp>
+      <p:sp>
+        <p:nvSpPr>
+          <p:cNvPr id="57" name=""/>
+          <p:cNvSpPr/>
           <p:nvPr/>
         </p:nvSpPr>
         <p:spPr>
           <a:xfrm>
-            <a:off x="5040000" y="2952000"/>
-            <a:ext cx="2412000" cy="1307520"/>
-          </a:xfrm>
-          <a:prstGeom prst="rect">
-            <a:avLst/>
-          </a:prstGeom>
-          <a:noFill/>
-          <a:ln w="0">
-            <a:noFill/>
-          </a:ln>
-        </p:spPr>
+            <a:off x="8352000" y="2952000"/>
+            <a:ext cx="1799640" cy="871200"/>
+          </a:xfrm>
+          <a:prstGeom prst="rect">
+            <a:avLst/>
+          </a:prstGeom>
+          <a:noFill/>
+          <a:ln w="0">
+            <a:noFill/>
+          </a:ln>
+        </p:spPr>
+        <p:style>
+          <a:lnRef idx="0"/>
+          <a:fillRef idx="0"/>
+          <a:effectRef idx="0"/>
+          <a:fontRef idx="minor"/>
+        </p:style>
         <p:txBody>
           <a:bodyPr lIns="90000" rIns="90000" tIns="45000" bIns="45000" anchor="t">
             <a:noAutofit/>
           </a:bodyPr>
           <a:p>
-            <a:r>
-              <a:rPr b="0" lang="pt-BR" sz="1300" spc="-1" strike="noStrike">
+            <a:pPr>
+              <a:lnSpc>
+                <a:spcPct val="100000"/>
+              </a:lnSpc>
+            </a:pPr>
+            <a:r>
+              <a:rPr b="0" lang="pt-BR" sz="1400" spc="-1" strike="noStrike">
                 <a:solidFill>
                   <a:srgbClr val="000000"/>
                 </a:solidFill>
                 <a:latin typeface="Inconsolata"/>
               </a:rPr>
-              <a:t>We recovered the data pipeline that was missing. But we did not understand why the Python notebook disappeared.</a:t>
-            </a:r>
-            <a:endParaRPr b="0" lang="pt-BR" sz="1300" spc="-1" strike="noStrike">
-              <a:solidFill>
-                <a:srgbClr val="000000"/>
-              </a:solidFill>
-              <a:latin typeface="Inconsolata"/>
-            </a:endParaRPr>
-          </a:p>
-        </p:txBody>
-      </p:sp>
-      <p:sp>
-        <p:nvSpPr>
-          <p:cNvPr id="53" name=""/>
+              <a:t>We identified this renaming as the source of the problems.</a:t>
+            </a:r>
+            <a:endParaRPr b="0" lang="pt-BR" sz="1400" spc="-1" strike="noStrike">
+              <a:solidFill>
+                <a:srgbClr val="000000"/>
+              </a:solidFill>
+              <a:latin typeface="Arial"/>
+            </a:endParaRPr>
+          </a:p>
+        </p:txBody>
+      </p:sp>
+      <p:sp>
+        <p:nvSpPr>
+          <p:cNvPr id="58" name=""/>
           <p:cNvSpPr/>
           <p:nvPr/>
         </p:nvSpPr>
         <p:spPr>
           <a:xfrm flipH="1" flipV="1">
-            <a:off x="5895000" y="2416320"/>
-            <a:ext cx="181440" cy="507960"/>
+            <a:off x="8267400" y="2415960"/>
+            <a:ext cx="388800" cy="476280"/>
           </a:xfrm>
           <a:prstGeom prst="line">
             <a:avLst/>
@@ -3596,217 +3929,7 @@
                 <a:srgbClr val="000000"/>
               </a:solidFill>
               <a:latin typeface="Arial"/>
-            </a:endParaRPr>
-          </a:p>
-        </p:txBody>
-      </p:sp>
-      <p:sp>
-        <p:nvSpPr>
-          <p:cNvPr id="54" name=""/>
-          <p:cNvSpPr txBox="1"/>
-          <p:nvPr/>
-        </p:nvSpPr>
-        <p:spPr>
-          <a:xfrm>
-            <a:off x="7848000" y="2135880"/>
-            <a:ext cx="540000" cy="276120"/>
-          </a:xfrm>
-          <a:prstGeom prst="rect">
-            <a:avLst/>
-          </a:prstGeom>
-          <a:noFill/>
-          <a:ln w="0">
-            <a:noFill/>
-          </a:ln>
-        </p:spPr>
-        <p:txBody>
-          <a:bodyPr lIns="90000" rIns="90000" tIns="45000" bIns="45000" anchor="ctr">
-            <a:noAutofit/>
-          </a:bodyPr>
-          <a:p>
-            <a:pPr algn="ctr"/>
-            <a:r>
-              <a:rPr b="0" lang="pt-BR" sz="1400" spc="-1" strike="noStrike">
-                <a:solidFill>
-                  <a:srgbClr val="000000"/>
-                </a:solidFill>
-                <a:latin typeface="Inconsolata"/>
-              </a:rPr>
-              <a:t>21</a:t>
-            </a:r>
-            <a:endParaRPr b="0" lang="pt-BR" sz="1400" spc="-1" strike="noStrike">
-              <a:solidFill>
-                <a:srgbClr val="000000"/>
-              </a:solidFill>
-              <a:latin typeface="Inconsolata"/>
-            </a:endParaRPr>
-          </a:p>
-        </p:txBody>
-      </p:sp>
-      <p:sp>
-        <p:nvSpPr>
-          <p:cNvPr id="55" name=""/>
-          <p:cNvSpPr txBox="1"/>
-          <p:nvPr/>
-        </p:nvSpPr>
-        <p:spPr>
-          <a:xfrm>
-            <a:off x="7272000" y="460440"/>
-            <a:ext cx="1980000" cy="871560"/>
-          </a:xfrm>
-          <a:prstGeom prst="rect">
-            <a:avLst/>
-          </a:prstGeom>
-          <a:noFill/>
-          <a:ln w="0">
-            <a:noFill/>
-          </a:ln>
-        </p:spPr>
-        <p:txBody>
-          <a:bodyPr lIns="90000" rIns="90000" tIns="45000" bIns="45000" anchor="t">
-            <a:noAutofit/>
-          </a:bodyPr>
-          <a:p>
-            <a:r>
-              <a:rPr b="0" lang="pt-BR" sz="1300" spc="-1" strike="noStrike">
-                <a:solidFill>
-                  <a:srgbClr val="000000"/>
-                </a:solidFill>
-                <a:latin typeface="Inconsolata"/>
-              </a:rPr>
-              <a:t>Our colleague renamed several Python notebooks in production</a:t>
-            </a:r>
-            <a:endParaRPr b="0" lang="pt-BR" sz="1300" spc="-1" strike="noStrike">
-              <a:solidFill>
-                <a:srgbClr val="000000"/>
-              </a:solidFill>
-              <a:latin typeface="Inconsolata"/>
-            </a:endParaRPr>
-          </a:p>
-        </p:txBody>
-      </p:sp>
-      <p:sp>
-        <p:nvSpPr>
-          <p:cNvPr id="56" name=""/>
-          <p:cNvSpPr/>
-          <p:nvPr/>
-        </p:nvSpPr>
-        <p:spPr>
-          <a:xfrm>
-            <a:off x="7776000" y="1296000"/>
-            <a:ext cx="180000" cy="540000"/>
-          </a:xfrm>
-          <a:prstGeom prst="line">
-            <a:avLst/>
-          </a:prstGeom>
-          <a:ln w="36000">
-            <a:solidFill>
-              <a:srgbClr val="000000"/>
-            </a:solidFill>
-            <a:round/>
-            <a:tailEnd len="med" type="triangle" w="med"/>
-          </a:ln>
-        </p:spPr>
-        <p:style>
-          <a:lnRef idx="0"/>
-          <a:fillRef idx="0"/>
-          <a:effectRef idx="0"/>
-          <a:fontRef idx="minor"/>
-        </p:style>
-        <p:txBody>
-          <a:bodyPr lIns="108000" rIns="108000" tIns="63000" bIns="63000" anchor="ctr">
-            <a:noAutofit/>
-          </a:bodyPr>
-          <a:p>
-            <a:endParaRPr b="0" lang="pt-BR" sz="1800" spc="-1" strike="noStrike">
-              <a:solidFill>
-                <a:srgbClr val="000000"/>
-              </a:solidFill>
-              <a:latin typeface="Arial"/>
-            </a:endParaRPr>
-          </a:p>
-        </p:txBody>
-      </p:sp>
-      <p:sp>
-        <p:nvSpPr>
-          <p:cNvPr id="57" name=""/>
-          <p:cNvSpPr txBox="1"/>
-          <p:nvPr/>
-        </p:nvSpPr>
-        <p:spPr>
-          <a:xfrm>
-            <a:off x="8352000" y="2952000"/>
-            <a:ext cx="1800000" cy="871560"/>
-          </a:xfrm>
-          <a:prstGeom prst="rect">
-            <a:avLst/>
-          </a:prstGeom>
-          <a:noFill/>
-          <a:ln w="0">
-            <a:noFill/>
-          </a:ln>
-        </p:spPr>
-        <p:txBody>
-          <a:bodyPr lIns="90000" rIns="90000" tIns="45000" bIns="45000" anchor="t">
-            <a:noAutofit/>
-          </a:bodyPr>
-          <a:p>
-            <a:r>
-              <a:rPr b="0" lang="pt-BR" sz="1300" spc="-1" strike="noStrike">
-                <a:solidFill>
-                  <a:srgbClr val="000000"/>
-                </a:solidFill>
-                <a:latin typeface="Inconsolata"/>
-              </a:rPr>
-              <a:t>We identified this renaming as the source of the problems.</a:t>
-            </a:r>
-            <a:endParaRPr b="0" lang="pt-BR" sz="1300" spc="-1" strike="noStrike">
-              <a:solidFill>
-                <a:srgbClr val="000000"/>
-              </a:solidFill>
-              <a:latin typeface="Inconsolata"/>
-            </a:endParaRPr>
-          </a:p>
-        </p:txBody>
-      </p:sp>
-      <p:sp>
-        <p:nvSpPr>
-          <p:cNvPr id="58" name=""/>
-          <p:cNvSpPr/>
-          <p:nvPr/>
-        </p:nvSpPr>
-        <p:spPr>
-          <a:xfrm flipH="1" flipV="1">
-            <a:off x="8267400" y="2415960"/>
-            <a:ext cx="388800" cy="476280"/>
-          </a:xfrm>
-          <a:prstGeom prst="line">
-            <a:avLst/>
-          </a:prstGeom>
-          <a:ln w="36000">
-            <a:solidFill>
-              <a:srgbClr val="000000"/>
-            </a:solidFill>
-            <a:round/>
-            <a:tailEnd len="med" type="triangle" w="med"/>
-          </a:ln>
-        </p:spPr>
-        <p:style>
-          <a:lnRef idx="0"/>
-          <a:fillRef idx="0"/>
-          <a:effectRef idx="0"/>
-          <a:fontRef idx="minor"/>
-        </p:style>
-        <p:txBody>
-          <a:bodyPr lIns="108000" rIns="108000" tIns="63000" bIns="63000" anchor="ctr">
-            <a:noAutofit/>
-          </a:bodyPr>
-          <a:p>
-            <a:endParaRPr b="0" lang="pt-BR" sz="1800" spc="-1" strike="noStrike">
-              <a:solidFill>
-                <a:srgbClr val="000000"/>
-              </a:solidFill>
-              <a:latin typeface="Arial"/>
+              <a:ea typeface="DejaVu Sans"/>
             </a:endParaRPr>
           </a:p>
         </p:txBody>

</xml_diff>